<commit_message>
remove cf flag; introduce cmp command instead;
</commit_message>
<xml_diff>
--- a/DOC/01_isa_encoding.pptx
+++ b/DOC/01_isa_encoding.pptx
@@ -245,7 +245,7 @@
           <a:p>
             <a:fld id="{EE595349-DA93-472D-828A-76CE9E4C1479}" type="datetimeFigureOut">
               <a:rPr lang="ru-RU" smtClean="0"/>
-              <a:t>08.02.2018</a:t>
+              <a:t>21.03.2018</a:t>
             </a:fld>
             <a:endParaRPr lang="ru-RU"/>
           </a:p>
@@ -415,7 +415,7 @@
           <a:p>
             <a:fld id="{EE595349-DA93-472D-828A-76CE9E4C1479}" type="datetimeFigureOut">
               <a:rPr lang="ru-RU" smtClean="0"/>
-              <a:t>08.02.2018</a:t>
+              <a:t>21.03.2018</a:t>
             </a:fld>
             <a:endParaRPr lang="ru-RU"/>
           </a:p>
@@ -595,7 +595,7 @@
           <a:p>
             <a:fld id="{EE595349-DA93-472D-828A-76CE9E4C1479}" type="datetimeFigureOut">
               <a:rPr lang="ru-RU" smtClean="0"/>
-              <a:t>08.02.2018</a:t>
+              <a:t>21.03.2018</a:t>
             </a:fld>
             <a:endParaRPr lang="ru-RU"/>
           </a:p>
@@ -765,7 +765,7 @@
           <a:p>
             <a:fld id="{EE595349-DA93-472D-828A-76CE9E4C1479}" type="datetimeFigureOut">
               <a:rPr lang="ru-RU" smtClean="0"/>
-              <a:t>08.02.2018</a:t>
+              <a:t>21.03.2018</a:t>
             </a:fld>
             <a:endParaRPr lang="ru-RU"/>
           </a:p>
@@ -1011,7 +1011,7 @@
           <a:p>
             <a:fld id="{EE595349-DA93-472D-828A-76CE9E4C1479}" type="datetimeFigureOut">
               <a:rPr lang="ru-RU" smtClean="0"/>
-              <a:t>08.02.2018</a:t>
+              <a:t>21.03.2018</a:t>
             </a:fld>
             <a:endParaRPr lang="ru-RU"/>
           </a:p>
@@ -1243,7 +1243,7 @@
           <a:p>
             <a:fld id="{EE595349-DA93-472D-828A-76CE9E4C1479}" type="datetimeFigureOut">
               <a:rPr lang="ru-RU" smtClean="0"/>
-              <a:t>08.02.2018</a:t>
+              <a:t>21.03.2018</a:t>
             </a:fld>
             <a:endParaRPr lang="ru-RU"/>
           </a:p>
@@ -1610,7 +1610,7 @@
           <a:p>
             <a:fld id="{EE595349-DA93-472D-828A-76CE9E4C1479}" type="datetimeFigureOut">
               <a:rPr lang="ru-RU" smtClean="0"/>
-              <a:t>08.02.2018</a:t>
+              <a:t>21.03.2018</a:t>
             </a:fld>
             <a:endParaRPr lang="ru-RU"/>
           </a:p>
@@ -1728,7 +1728,7 @@
           <a:p>
             <a:fld id="{EE595349-DA93-472D-828A-76CE9E4C1479}" type="datetimeFigureOut">
               <a:rPr lang="ru-RU" smtClean="0"/>
-              <a:t>08.02.2018</a:t>
+              <a:t>21.03.2018</a:t>
             </a:fld>
             <a:endParaRPr lang="ru-RU"/>
           </a:p>
@@ -1823,7 +1823,7 @@
           <a:p>
             <a:fld id="{EE595349-DA93-472D-828A-76CE9E4C1479}" type="datetimeFigureOut">
               <a:rPr lang="ru-RU" smtClean="0"/>
-              <a:t>08.02.2018</a:t>
+              <a:t>21.03.2018</a:t>
             </a:fld>
             <a:endParaRPr lang="ru-RU"/>
           </a:p>
@@ -2100,7 +2100,7 @@
           <a:p>
             <a:fld id="{EE595349-DA93-472D-828A-76CE9E4C1479}" type="datetimeFigureOut">
               <a:rPr lang="ru-RU" smtClean="0"/>
-              <a:t>08.02.2018</a:t>
+              <a:t>21.03.2018</a:t>
             </a:fld>
             <a:endParaRPr lang="ru-RU"/>
           </a:p>
@@ -2353,7 +2353,7 @@
           <a:p>
             <a:fld id="{EE595349-DA93-472D-828A-76CE9E4C1479}" type="datetimeFigureOut">
               <a:rPr lang="ru-RU" smtClean="0"/>
-              <a:t>08.02.2018</a:t>
+              <a:t>21.03.2018</a:t>
             </a:fld>
             <a:endParaRPr lang="ru-RU"/>
           </a:p>
@@ -2566,7 +2566,7 @@
           <a:p>
             <a:fld id="{EE595349-DA93-472D-828A-76CE9E4C1479}" type="datetimeFigureOut">
               <a:rPr lang="ru-RU" smtClean="0"/>
-              <a:t>08.02.2018</a:t>
+              <a:t>21.03.2018</a:t>
             </a:fld>
             <a:endParaRPr lang="ru-RU"/>
           </a:p>
@@ -3069,11 +3069,7 @@
           <a:p>
             <a:r>
               <a:rPr lang="en-US" dirty="0" smtClean="0"/>
-              <a:t>ALU (integer) </a:t>
-            </a:r>
-            <a:r>
-              <a:rPr lang="en-US" dirty="0" smtClean="0"/>
-              <a:t>Instructions </a:t>
+              <a:t>ALU (integer) Instructions </a:t>
             </a:r>
             <a:endParaRPr lang="ru-RU" dirty="0"/>
           </a:p>
@@ -4054,7 +4050,7 @@
                   <a:schemeClr val="tx1"/>
                 </a:solidFill>
               </a:rPr>
-              <a:t>10</a:t>
+              <a:t>11 -</a:t>
             </a:r>
             <a:r>
               <a:rPr lang="ru-RU" dirty="0" smtClean="0">
@@ -4070,7 +4066,7 @@
                   <a:schemeClr val="tx1"/>
                 </a:solidFill>
               </a:rPr>
-              <a:t>5</a:t>
+              <a:t> 5</a:t>
             </a:r>
             <a:endParaRPr lang="ru-RU" dirty="0">
               <a:solidFill>
@@ -4104,7 +4100,7 @@
           <a:p>
             <a:r>
               <a:rPr lang="en-US" dirty="0"/>
-              <a:t>6</a:t>
+              <a:t>7</a:t>
             </a:r>
             <a:endParaRPr lang="ru-RU" dirty="0"/>
           </a:p>
@@ -4238,15 +4234,7 @@
           <a:p>
             <a:r>
               <a:rPr lang="en-US" dirty="0" smtClean="0"/>
-              <a:t>R0                 R1                 R2                                not used                </a:t>
-            </a:r>
-            <a:r>
-              <a:rPr lang="en-US" dirty="0" smtClean="0"/>
-              <a:t>cond. </a:t>
-            </a:r>
-            <a:r>
-              <a:rPr lang="en-US" dirty="0" smtClean="0"/>
-              <a:t>flags</a:t>
+              <a:t>R0                 R1                 R2                                not used                cond. flags</a:t>
             </a:r>
             <a:endParaRPr lang="ru-RU" dirty="0"/>
           </a:p>
@@ -4312,72 +4300,50 @@
       </p:sp>
       <p:sp>
         <p:nvSpPr>
-          <p:cNvPr id="43" name="Rectangle 42"/>
-          <p:cNvSpPr/>
+          <p:cNvPr id="45" name="TextBox 44"/>
+          <p:cNvSpPr txBox="1"/>
           <p:nvPr/>
         </p:nvSpPr>
         <p:spPr>
           <a:xfrm>
-            <a:off x="7552940" y="2289922"/>
-            <a:ext cx="415636" cy="450836"/>
+            <a:off x="7208886" y="4271334"/>
+            <a:ext cx="4320050" cy="369332"/>
           </a:xfrm>
           <a:prstGeom prst="rect">
             <a:avLst/>
           </a:prstGeom>
           <a:noFill/>
-          <a:ln w="25400">
-            <a:solidFill>
-              <a:schemeClr val="tx1"/>
-            </a:solidFill>
-          </a:ln>
-        </p:spPr>
-        <p:style>
-          <a:lnRef idx="2">
-            <a:schemeClr val="accent1">
-              <a:shade val="50000"/>
-            </a:schemeClr>
-          </a:lnRef>
-          <a:fillRef idx="1">
-            <a:schemeClr val="accent1"/>
-          </a:fillRef>
-          <a:effectRef idx="0">
-            <a:schemeClr val="accent1"/>
-          </a:effectRef>
-          <a:fontRef idx="minor">
-            <a:schemeClr val="lt1"/>
-          </a:fontRef>
-        </p:style>
-        <p:txBody>
-          <a:bodyPr rtlCol="0" anchor="ctr"/>
-          <a:lstStyle/>
-          <a:p>
-            <a:pPr algn="ctr"/>
+        </p:spPr>
+        <p:txBody>
+          <a:bodyPr wrap="square" rtlCol="0">
+            <a:spAutoFit/>
+          </a:bodyPr>
+          <a:lstStyle/>
+          <a:p>
             <a:r>
               <a:rPr lang="en-US" dirty="0" smtClean="0">
-                <a:solidFill>
-                  <a:schemeClr val="tx1"/>
-                </a:solidFill>
-              </a:rPr>
-              <a:t>11</a:t>
+                <a:latin typeface="Times New Roman" panose="02020603050405020304" pitchFamily="18" charset="0"/>
+                <a:cs typeface="Times New Roman" panose="02020603050405020304" pitchFamily="18" charset="0"/>
+              </a:rPr>
+              <a:t>S – signed flag; if set operation is signed</a:t>
             </a:r>
             <a:endParaRPr lang="ru-RU" dirty="0">
-              <a:solidFill>
-                <a:schemeClr val="tx1"/>
-              </a:solidFill>
+              <a:latin typeface="Times New Roman" panose="02020603050405020304" pitchFamily="18" charset="0"/>
+              <a:cs typeface="Times New Roman" panose="02020603050405020304" pitchFamily="18" charset="0"/>
             </a:endParaRPr>
           </a:p>
         </p:txBody>
       </p:sp>
       <p:cxnSp>
         <p:nvCxnSpPr>
-          <p:cNvPr id="44" name="Straight Arrow Connector 43"/>
+          <p:cNvPr id="46" name="Straight Arrow Connector 45"/>
           <p:cNvCxnSpPr/>
           <p:nvPr/>
         </p:nvCxnSpPr>
         <p:spPr>
-          <a:xfrm flipH="1">
-            <a:off x="7345122" y="2823957"/>
-            <a:ext cx="1" cy="815109"/>
+          <a:xfrm>
+            <a:off x="7340341" y="2855235"/>
+            <a:ext cx="9561" cy="1373225"/>
           </a:xfrm>
           <a:prstGeom prst="straightConnector1">
             <a:avLst/>
@@ -4403,118 +4369,6 @@
       </p:cxnSp>
       <p:sp>
         <p:nvSpPr>
-          <p:cNvPr id="45" name="TextBox 44"/>
-          <p:cNvSpPr txBox="1"/>
-          <p:nvPr/>
-        </p:nvSpPr>
-        <p:spPr>
-          <a:xfrm>
-            <a:off x="7629236" y="4258996"/>
-            <a:ext cx="4320050" cy="369332"/>
-          </a:xfrm>
-          <a:prstGeom prst="rect">
-            <a:avLst/>
-          </a:prstGeom>
-          <a:noFill/>
-        </p:spPr>
-        <p:txBody>
-          <a:bodyPr wrap="square" rtlCol="0">
-            <a:spAutoFit/>
-          </a:bodyPr>
-          <a:lstStyle/>
-          <a:p>
-            <a:r>
-              <a:rPr lang="en-US" dirty="0" smtClean="0">
-                <a:latin typeface="Times New Roman" panose="02020603050405020304" pitchFamily="18" charset="0"/>
-                <a:cs typeface="Times New Roman" panose="02020603050405020304" pitchFamily="18" charset="0"/>
-              </a:rPr>
-              <a:t>S – signed flag; if set operation is signed</a:t>
-            </a:r>
-            <a:endParaRPr lang="ru-RU" dirty="0">
-              <a:latin typeface="Times New Roman" panose="02020603050405020304" pitchFamily="18" charset="0"/>
-              <a:cs typeface="Times New Roman" panose="02020603050405020304" pitchFamily="18" charset="0"/>
-            </a:endParaRPr>
-          </a:p>
-        </p:txBody>
-      </p:sp>
-      <p:cxnSp>
-        <p:nvCxnSpPr>
-          <p:cNvPr id="46" name="Straight Arrow Connector 45"/>
-          <p:cNvCxnSpPr/>
-          <p:nvPr/>
-        </p:nvCxnSpPr>
-        <p:spPr>
-          <a:xfrm>
-            <a:off x="7760759" y="2846987"/>
-            <a:ext cx="9561" cy="1373225"/>
-          </a:xfrm>
-          <a:prstGeom prst="straightConnector1">
-            <a:avLst/>
-          </a:prstGeom>
-          <a:ln>
-            <a:tailEnd type="triangle"/>
-          </a:ln>
-        </p:spPr>
-        <p:style>
-          <a:lnRef idx="1">
-            <a:schemeClr val="accent1"/>
-          </a:lnRef>
-          <a:fillRef idx="0">
-            <a:schemeClr val="accent1"/>
-          </a:fillRef>
-          <a:effectRef idx="0">
-            <a:schemeClr val="accent1"/>
-          </a:effectRef>
-          <a:fontRef idx="minor">
-            <a:schemeClr val="tx1"/>
-          </a:fontRef>
-        </p:style>
-      </p:cxnSp>
-      <p:sp>
-        <p:nvSpPr>
-          <p:cNvPr id="47" name="TextBox 46"/>
-          <p:cNvSpPr txBox="1"/>
-          <p:nvPr/>
-        </p:nvSpPr>
-        <p:spPr>
-          <a:xfrm>
-            <a:off x="7170643" y="3670460"/>
-            <a:ext cx="4616857" cy="369332"/>
-          </a:xfrm>
-          <a:prstGeom prst="rect">
-            <a:avLst/>
-          </a:prstGeom>
-          <a:noFill/>
-        </p:spPr>
-        <p:txBody>
-          <a:bodyPr wrap="square" rtlCol="0">
-            <a:spAutoFit/>
-          </a:bodyPr>
-          <a:lstStyle/>
-          <a:p>
-            <a:r>
-              <a:rPr lang="en-US" dirty="0">
-                <a:latin typeface="Times New Roman" panose="02020603050405020304" pitchFamily="18" charset="0"/>
-                <a:cs typeface="Times New Roman" panose="02020603050405020304" pitchFamily="18" charset="0"/>
-              </a:rPr>
-              <a:t>C</a:t>
-            </a:r>
-            <a:r>
-              <a:rPr lang="en-US" dirty="0" smtClean="0">
-                <a:latin typeface="Times New Roman" panose="02020603050405020304" pitchFamily="18" charset="0"/>
-                <a:cs typeface="Times New Roman" panose="02020603050405020304" pitchFamily="18" charset="0"/>
-              </a:rPr>
-              <a:t>F – change flags; if set, operation change flags</a:t>
-            </a:r>
-            <a:endParaRPr lang="ru-RU" dirty="0">
-              <a:latin typeface="Times New Roman" panose="02020603050405020304" pitchFamily="18" charset="0"/>
-              <a:cs typeface="Times New Roman" panose="02020603050405020304" pitchFamily="18" charset="0"/>
-            </a:endParaRPr>
-          </a:p>
-        </p:txBody>
-      </p:sp>
-      <p:sp>
-        <p:nvSpPr>
           <p:cNvPr id="48" name="TextBox 47"/>
           <p:cNvSpPr txBox="1"/>
           <p:nvPr/>
@@ -4522,36 +4376,6 @@
         <p:spPr>
           <a:xfrm>
             <a:off x="7208886" y="1815457"/>
-            <a:ext cx="272472" cy="369332"/>
-          </a:xfrm>
-          <a:prstGeom prst="rect">
-            <a:avLst/>
-          </a:prstGeom>
-          <a:noFill/>
-        </p:spPr>
-        <p:txBody>
-          <a:bodyPr wrap="square" rtlCol="0">
-            <a:spAutoFit/>
-          </a:bodyPr>
-          <a:lstStyle/>
-          <a:p>
-            <a:r>
-              <a:rPr lang="en-US" dirty="0"/>
-              <a:t>1</a:t>
-            </a:r>
-            <a:endParaRPr lang="ru-RU" dirty="0"/>
-          </a:p>
-        </p:txBody>
-      </p:sp>
-      <p:sp>
-        <p:nvSpPr>
-          <p:cNvPr id="49" name="TextBox 48"/>
-          <p:cNvSpPr txBox="1"/>
-          <p:nvPr/>
-        </p:nvSpPr>
-        <p:spPr>
-          <a:xfrm>
-            <a:off x="7629236" y="1820869"/>
             <a:ext cx="272472" cy="369332"/>
           </a:xfrm>
           <a:prstGeom prst="rect">

</xml_diff>

<commit_message>
remove cf flag from assembly; add c-type instruction to isa doc;
</commit_message>
<xml_diff>
--- a/DOC/01_isa_encoding.pptx
+++ b/DOC/01_isa_encoding.pptx
@@ -8,6 +8,7 @@
     <p:sldId id="256" r:id="rId2"/>
     <p:sldId id="258" r:id="rId3"/>
     <p:sldId id="257" r:id="rId4"/>
+    <p:sldId id="260" r:id="rId5"/>
   </p:sldIdLst>
   <p:sldSz cx="12192000" cy="6858000"/>
   <p:notesSz cx="6858000" cy="9144000"/>
@@ -3069,7 +3070,7 @@
           <a:p>
             <a:r>
               <a:rPr lang="en-US" dirty="0" smtClean="0"/>
-              <a:t>ALU (integer) Instructions </a:t>
+              <a:t>A-type Instructions </a:t>
             </a:r>
             <a:endParaRPr lang="ru-RU" dirty="0"/>
           </a:p>
@@ -3650,16 +3651,23 @@
                 <a:latin typeface="Times New Roman" panose="02020603050405020304" pitchFamily="18" charset="0"/>
                 <a:cs typeface="Times New Roman" panose="02020603050405020304" pitchFamily="18" charset="0"/>
               </a:rPr>
-              <a:t>bits are equal to “</a:t>
-            </a:r>
-            <a:r>
-              <a:rPr lang="en-US" dirty="0" smtClean="0">
+              <a:t>bits are equal to </a:t>
+            </a:r>
+            <a:r>
+              <a:rPr lang="en-US" b="1" u="sng" dirty="0">
                 <a:latin typeface="Times New Roman" panose="02020603050405020304" pitchFamily="18" charset="0"/>
                 <a:cs typeface="Times New Roman" panose="02020603050405020304" pitchFamily="18" charset="0"/>
               </a:rPr>
+              <a:t>“</a:t>
+            </a:r>
+            <a:r>
+              <a:rPr lang="en-US" b="1" u="sng" dirty="0" smtClean="0">
+                <a:latin typeface="Times New Roman" panose="02020603050405020304" pitchFamily="18" charset="0"/>
+                <a:cs typeface="Times New Roman" panose="02020603050405020304" pitchFamily="18" charset="0"/>
+              </a:rPr>
               <a:t>000”</a:t>
             </a:r>
-            <a:endParaRPr lang="ru-RU" dirty="0">
+            <a:endParaRPr lang="ru-RU" b="1" u="sng" dirty="0">
               <a:latin typeface="Times New Roman" panose="02020603050405020304" pitchFamily="18" charset="0"/>
               <a:cs typeface="Times New Roman" panose="02020603050405020304" pitchFamily="18" charset="0"/>
             </a:endParaRPr>
@@ -4568,6 +4576,76 @@
           </a:p>
         </p:txBody>
       </p:sp>
+      <p:cxnSp>
+        <p:nvCxnSpPr>
+          <p:cNvPr id="5" name="Straight Connector 4"/>
+          <p:cNvCxnSpPr/>
+          <p:nvPr/>
+        </p:nvCxnSpPr>
+        <p:spPr>
+          <a:xfrm>
+            <a:off x="7552940" y="2293605"/>
+            <a:ext cx="2057486" cy="447153"/>
+          </a:xfrm>
+          <a:prstGeom prst="line">
+            <a:avLst/>
+          </a:prstGeom>
+          <a:ln w="12700">
+            <a:solidFill>
+              <a:srgbClr val="FF0000"/>
+            </a:solidFill>
+          </a:ln>
+        </p:spPr>
+        <p:style>
+          <a:lnRef idx="1">
+            <a:schemeClr val="accent1"/>
+          </a:lnRef>
+          <a:fillRef idx="0">
+            <a:schemeClr val="accent1"/>
+          </a:fillRef>
+          <a:effectRef idx="0">
+            <a:schemeClr val="accent1"/>
+          </a:effectRef>
+          <a:fontRef idx="minor">
+            <a:schemeClr val="tx1"/>
+          </a:fontRef>
+        </p:style>
+      </p:cxnSp>
+      <p:cxnSp>
+        <p:nvCxnSpPr>
+          <p:cNvPr id="43" name="Straight Connector 42"/>
+          <p:cNvCxnSpPr/>
+          <p:nvPr/>
+        </p:nvCxnSpPr>
+        <p:spPr>
+          <a:xfrm flipV="1">
+            <a:off x="7552940" y="2293605"/>
+            <a:ext cx="2057486" cy="447153"/>
+          </a:xfrm>
+          <a:prstGeom prst="line">
+            <a:avLst/>
+          </a:prstGeom>
+          <a:ln w="12700">
+            <a:solidFill>
+              <a:srgbClr val="FF0000"/>
+            </a:solidFill>
+          </a:ln>
+        </p:spPr>
+        <p:style>
+          <a:lnRef idx="1">
+            <a:schemeClr val="accent1"/>
+          </a:lnRef>
+          <a:fillRef idx="0">
+            <a:schemeClr val="accent1"/>
+          </a:fillRef>
+          <a:effectRef idx="0">
+            <a:schemeClr val="accent1"/>
+          </a:effectRef>
+          <a:fontRef idx="minor">
+            <a:schemeClr val="tx1"/>
+          </a:fontRef>
+        </p:style>
+      </p:cxnSp>
     </p:spTree>
     <p:extLst>
       <p:ext uri="{BB962C8B-B14F-4D97-AF65-F5344CB8AC3E}">
@@ -4620,7 +4698,11 @@
           <a:p>
             <a:r>
               <a:rPr lang="en-US" dirty="0" smtClean="0"/>
-              <a:t>MEM Instructions </a:t>
+              <a:t>M-type </a:t>
+            </a:r>
+            <a:r>
+              <a:rPr lang="en-US" dirty="0" smtClean="0"/>
+              <a:t>Instructions </a:t>
             </a:r>
             <a:endParaRPr lang="ru-RU" dirty="0"/>
           </a:p>
@@ -4915,11 +4997,25 @@
           </a:p>
           <a:p>
             <a:r>
+              <a:rPr lang="en-US" dirty="0">
+                <a:latin typeface="Times New Roman" panose="02020603050405020304" pitchFamily="18" charset="0"/>
+                <a:cs typeface="Times New Roman" panose="02020603050405020304" pitchFamily="18" charset="0"/>
+              </a:rPr>
+              <a:t>M</a:t>
+            </a:r>
+            <a:r>
               <a:rPr lang="en-US" dirty="0" smtClean="0">
                 <a:latin typeface="Times New Roman" panose="02020603050405020304" pitchFamily="18" charset="0"/>
                 <a:cs typeface="Times New Roman" panose="02020603050405020304" pitchFamily="18" charset="0"/>
               </a:rPr>
-              <a:t>R-type  commands use ‘</a:t>
+              <a:t>-type  commands </a:t>
+            </a:r>
+            <a:r>
+              <a:rPr lang="en-US" dirty="0" smtClean="0">
+                <a:latin typeface="Times New Roman" panose="02020603050405020304" pitchFamily="18" charset="0"/>
+                <a:cs typeface="Times New Roman" panose="02020603050405020304" pitchFamily="18" charset="0"/>
+              </a:rPr>
+              <a:t>use ‘</a:t>
             </a:r>
             <a:r>
               <a:rPr lang="en-US" dirty="0" smtClean="0"/>
@@ -5544,7 +5640,7 @@
         </p:nvSpPr>
         <p:spPr>
           <a:xfrm>
-            <a:off x="8201892" y="1806409"/>
+            <a:off x="8214373" y="1833602"/>
             <a:ext cx="272472" cy="369332"/>
           </a:xfrm>
           <a:prstGeom prst="rect">
@@ -6071,21 +6167,386 @@
                 <a:latin typeface="Times New Roman" panose="02020603050405020304" pitchFamily="18" charset="0"/>
                 <a:cs typeface="Times New Roman" panose="02020603050405020304" pitchFamily="18" charset="0"/>
               </a:rPr>
-              <a:t>ALU instructions 30—28 </a:t>
+              <a:t>MEM</a:t>
+            </a:r>
+            <a:r>
+              <a:rPr lang="en-US" dirty="0" smtClean="0">
+                <a:latin typeface="Times New Roman" panose="02020603050405020304" pitchFamily="18" charset="0"/>
+                <a:cs typeface="Times New Roman" panose="02020603050405020304" pitchFamily="18" charset="0"/>
+              </a:rPr>
+              <a:t> </a:t>
+            </a:r>
+            <a:r>
+              <a:rPr lang="en-US" dirty="0" smtClean="0">
+                <a:latin typeface="Times New Roman" panose="02020603050405020304" pitchFamily="18" charset="0"/>
+                <a:cs typeface="Times New Roman" panose="02020603050405020304" pitchFamily="18" charset="0"/>
+              </a:rPr>
+              <a:t>instructions 30—28 </a:t>
             </a:r>
             <a:r>
               <a:rPr lang="en-US" dirty="0">
                 <a:latin typeface="Times New Roman" panose="02020603050405020304" pitchFamily="18" charset="0"/>
                 <a:cs typeface="Times New Roman" panose="02020603050405020304" pitchFamily="18" charset="0"/>
               </a:rPr>
-              <a:t>bits are equal to “</a:t>
-            </a:r>
+              <a:t>bits are equal to </a:t>
+            </a:r>
+            <a:r>
+              <a:rPr lang="en-US" b="1" u="sng" dirty="0">
+                <a:latin typeface="Times New Roman" panose="02020603050405020304" pitchFamily="18" charset="0"/>
+                <a:cs typeface="Times New Roman" panose="02020603050405020304" pitchFamily="18" charset="0"/>
+              </a:rPr>
+              <a:t>“</a:t>
+            </a:r>
+            <a:r>
+              <a:rPr lang="en-US" b="1" u="sng" dirty="0" smtClean="0">
+                <a:latin typeface="Times New Roman" panose="02020603050405020304" pitchFamily="18" charset="0"/>
+                <a:cs typeface="Times New Roman" panose="02020603050405020304" pitchFamily="18" charset="0"/>
+              </a:rPr>
+              <a:t>010</a:t>
+            </a:r>
+            <a:r>
+              <a:rPr lang="en-US" b="1" u="sng" dirty="0" smtClean="0">
+                <a:latin typeface="Times New Roman" panose="02020603050405020304" pitchFamily="18" charset="0"/>
+                <a:cs typeface="Times New Roman" panose="02020603050405020304" pitchFamily="18" charset="0"/>
+              </a:rPr>
+              <a:t>”</a:t>
+            </a:r>
+            <a:endParaRPr lang="ru-RU" b="1" u="sng" dirty="0">
+              <a:latin typeface="Times New Roman" panose="02020603050405020304" pitchFamily="18" charset="0"/>
+              <a:cs typeface="Times New Roman" panose="02020603050405020304" pitchFamily="18" charset="0"/>
+            </a:endParaRPr>
+          </a:p>
+        </p:txBody>
+      </p:sp>
+    </p:spTree>
+    <p:extLst>
+      <p:ext uri="{BB962C8B-B14F-4D97-AF65-F5344CB8AC3E}">
+        <p14:creationId xmlns:p14="http://schemas.microsoft.com/office/powerpoint/2010/main" val="2904222640"/>
+      </p:ext>
+    </p:extLst>
+  </p:cSld>
+  <p:clrMapOvr>
+    <a:masterClrMapping/>
+  </p:clrMapOvr>
+</p:sld>
+</file>
+
+<file path=ppt/slides/slide4.xml><?xml version="1.0" encoding="utf-8"?>
+<p:sld xmlns:a="http://schemas.openxmlformats.org/drawingml/2006/main" xmlns:r="http://schemas.openxmlformats.org/officeDocument/2006/relationships" xmlns:p="http://schemas.openxmlformats.org/presentationml/2006/main">
+  <p:cSld>
+    <p:spTree>
+      <p:nvGrpSpPr>
+        <p:cNvPr id="1" name=""/>
+        <p:cNvGrpSpPr/>
+        <p:nvPr/>
+      </p:nvGrpSpPr>
+      <p:grpSpPr>
+        <a:xfrm>
+          <a:off x="0" y="0"/>
+          <a:ext cx="0" cy="0"/>
+          <a:chOff x="0" y="0"/>
+          <a:chExt cx="0" cy="0"/>
+        </a:xfrm>
+      </p:grpSpPr>
+      <p:sp>
+        <p:nvSpPr>
+          <p:cNvPr id="2" name="Title 1"/>
+          <p:cNvSpPr>
+            <a:spLocks noGrp="1"/>
+          </p:cNvSpPr>
+          <p:nvPr>
+            <p:ph type="title"/>
+          </p:nvPr>
+        </p:nvSpPr>
+        <p:spPr>
+          <a:xfrm>
+            <a:off x="1346199" y="605392"/>
+            <a:ext cx="10515600" cy="1325563"/>
+          </a:xfrm>
+        </p:spPr>
+        <p:txBody>
+          <a:bodyPr/>
+          <a:lstStyle/>
+          <a:p>
+            <a:r>
+              <a:rPr lang="en-US" dirty="0" smtClean="0"/>
+              <a:t>C-type </a:t>
+            </a:r>
+            <a:r>
+              <a:rPr lang="en-US" dirty="0" smtClean="0"/>
+              <a:t>Instructions </a:t>
+            </a:r>
+            <a:endParaRPr lang="ru-RU" dirty="0"/>
+          </a:p>
+        </p:txBody>
+      </p:sp>
+      <p:sp>
+        <p:nvSpPr>
+          <p:cNvPr id="4" name="Rectangle 3"/>
+          <p:cNvSpPr/>
+          <p:nvPr/>
+        </p:nvSpPr>
+        <p:spPr>
+          <a:xfrm>
+            <a:off x="489526" y="2287776"/>
+            <a:ext cx="10557165" cy="455424"/>
+          </a:xfrm>
+          <a:prstGeom prst="rect">
+            <a:avLst/>
+          </a:prstGeom>
+          <a:noFill/>
+          <a:ln w="25400">
+            <a:solidFill>
+              <a:schemeClr val="tx1"/>
+            </a:solidFill>
+          </a:ln>
+        </p:spPr>
+        <p:style>
+          <a:lnRef idx="2">
+            <a:schemeClr val="accent1">
+              <a:shade val="50000"/>
+            </a:schemeClr>
+          </a:lnRef>
+          <a:fillRef idx="1">
+            <a:schemeClr val="accent1"/>
+          </a:fillRef>
+          <a:effectRef idx="0">
+            <a:schemeClr val="accent1"/>
+          </a:effectRef>
+          <a:fontRef idx="minor">
+            <a:schemeClr val="lt1"/>
+          </a:fontRef>
+        </p:style>
+        <p:txBody>
+          <a:bodyPr rtlCol="0" anchor="ctr"/>
+          <a:lstStyle/>
+          <a:p>
+            <a:pPr algn="ctr"/>
+            <a:endParaRPr lang="ru-RU" dirty="0">
+              <a:solidFill>
+                <a:schemeClr val="tx1"/>
+              </a:solidFill>
+            </a:endParaRPr>
+          </a:p>
+        </p:txBody>
+      </p:sp>
+      <p:sp>
+        <p:nvSpPr>
+          <p:cNvPr id="6" name="Rectangle 5"/>
+          <p:cNvSpPr/>
+          <p:nvPr/>
+        </p:nvSpPr>
+        <p:spPr>
+          <a:xfrm>
+            <a:off x="489527" y="2287775"/>
+            <a:ext cx="415636" cy="455425"/>
+          </a:xfrm>
+          <a:prstGeom prst="rect">
+            <a:avLst/>
+          </a:prstGeom>
+          <a:noFill/>
+          <a:ln w="25400">
+            <a:solidFill>
+              <a:schemeClr val="tx1"/>
+            </a:solidFill>
+          </a:ln>
+        </p:spPr>
+        <p:style>
+          <a:lnRef idx="2">
+            <a:schemeClr val="accent1">
+              <a:shade val="50000"/>
+            </a:schemeClr>
+          </a:lnRef>
+          <a:fillRef idx="1">
+            <a:schemeClr val="accent1"/>
+          </a:fillRef>
+          <a:effectRef idx="0">
+            <a:schemeClr val="accent1"/>
+          </a:effectRef>
+          <a:fontRef idx="minor">
+            <a:schemeClr val="lt1"/>
+          </a:fontRef>
+        </p:style>
+        <p:txBody>
+          <a:bodyPr rtlCol="0" anchor="ctr"/>
+          <a:lstStyle/>
+          <a:p>
+            <a:pPr algn="ctr"/>
+            <a:r>
+              <a:rPr lang="ru-RU" dirty="0" smtClean="0">
+                <a:solidFill>
+                  <a:schemeClr val="tx1"/>
+                </a:solidFill>
+              </a:rPr>
+              <a:t>31</a:t>
+            </a:r>
+            <a:endParaRPr lang="ru-RU" dirty="0">
+              <a:solidFill>
+                <a:schemeClr val="tx1"/>
+              </a:solidFill>
+            </a:endParaRPr>
+          </a:p>
+        </p:txBody>
+      </p:sp>
+      <p:sp>
+        <p:nvSpPr>
+          <p:cNvPr id="10" name="Rectangle 9"/>
+          <p:cNvSpPr/>
+          <p:nvPr/>
+        </p:nvSpPr>
+        <p:spPr>
+          <a:xfrm>
+            <a:off x="902854" y="2287776"/>
+            <a:ext cx="1249217" cy="455424"/>
+          </a:xfrm>
+          <a:prstGeom prst="rect">
+            <a:avLst/>
+          </a:prstGeom>
+          <a:noFill/>
+          <a:ln w="25400">
+            <a:solidFill>
+              <a:schemeClr val="tx1"/>
+            </a:solidFill>
+          </a:ln>
+        </p:spPr>
+        <p:style>
+          <a:lnRef idx="2">
+            <a:schemeClr val="accent1">
+              <a:shade val="50000"/>
+            </a:schemeClr>
+          </a:lnRef>
+          <a:fillRef idx="1">
+            <a:schemeClr val="accent1"/>
+          </a:fillRef>
+          <a:effectRef idx="0">
+            <a:schemeClr val="accent1"/>
+          </a:effectRef>
+          <a:fontRef idx="minor">
+            <a:schemeClr val="lt1"/>
+          </a:fontRef>
+        </p:style>
+        <p:txBody>
+          <a:bodyPr rtlCol="0" anchor="ctr"/>
+          <a:lstStyle/>
+          <a:p>
+            <a:pPr algn="ctr"/>
+            <a:r>
+              <a:rPr lang="en-US" dirty="0" smtClean="0">
+                <a:solidFill>
+                  <a:schemeClr val="tx1"/>
+                </a:solidFill>
+              </a:rPr>
+              <a:t>30 -- </a:t>
+            </a:r>
+            <a:r>
+              <a:rPr lang="ru-RU" dirty="0" smtClean="0">
+                <a:solidFill>
+                  <a:schemeClr val="tx1"/>
+                </a:solidFill>
+              </a:rPr>
+              <a:t>28</a:t>
+            </a:r>
+            <a:endParaRPr lang="ru-RU" dirty="0">
+              <a:solidFill>
+                <a:schemeClr val="tx1"/>
+              </a:solidFill>
+            </a:endParaRPr>
+          </a:p>
+        </p:txBody>
+      </p:sp>
+      <p:cxnSp>
+        <p:nvCxnSpPr>
+          <p:cNvPr id="13" name="Straight Arrow Connector 12"/>
+          <p:cNvCxnSpPr>
+            <a:stCxn id="6" idx="2"/>
+          </p:cNvCxnSpPr>
+          <p:nvPr/>
+        </p:nvCxnSpPr>
+        <p:spPr>
+          <a:xfrm flipH="1">
+            <a:off x="695036" y="2743200"/>
+            <a:ext cx="2309" cy="711200"/>
+          </a:xfrm>
+          <a:prstGeom prst="straightConnector1">
+            <a:avLst/>
+          </a:prstGeom>
+          <a:ln>
+            <a:tailEnd type="triangle"/>
+          </a:ln>
+        </p:spPr>
+        <p:style>
+          <a:lnRef idx="1">
+            <a:schemeClr val="accent1"/>
+          </a:lnRef>
+          <a:fillRef idx="0">
+            <a:schemeClr val="accent1"/>
+          </a:fillRef>
+          <a:effectRef idx="0">
+            <a:schemeClr val="accent1"/>
+          </a:effectRef>
+          <a:fontRef idx="minor">
+            <a:schemeClr val="tx1"/>
+          </a:fontRef>
+        </p:style>
+      </p:cxnSp>
+      <p:sp>
+        <p:nvSpPr>
+          <p:cNvPr id="15" name="TextBox 14"/>
+          <p:cNvSpPr txBox="1"/>
+          <p:nvPr/>
+        </p:nvSpPr>
+        <p:spPr>
+          <a:xfrm>
+            <a:off x="535707" y="3454400"/>
+            <a:ext cx="7666184" cy="646331"/>
+          </a:xfrm>
+          <a:prstGeom prst="rect">
+            <a:avLst/>
+          </a:prstGeom>
+          <a:noFill/>
+        </p:spPr>
+        <p:txBody>
+          <a:bodyPr wrap="square" rtlCol="0">
+            <a:spAutoFit/>
+          </a:bodyPr>
+          <a:lstStyle/>
+          <a:p>
             <a:r>
               <a:rPr lang="en-US" dirty="0" smtClean="0">
                 <a:latin typeface="Times New Roman" panose="02020603050405020304" pitchFamily="18" charset="0"/>
                 <a:cs typeface="Times New Roman" panose="02020603050405020304" pitchFamily="18" charset="0"/>
               </a:rPr>
-              <a:t>000”</a:t>
+              <a:t>I</a:t>
+            </a:r>
+            <a:r>
+              <a:rPr lang="en-US" dirty="0">
+                <a:latin typeface="Times New Roman" panose="02020603050405020304" pitchFamily="18" charset="0"/>
+                <a:cs typeface="Times New Roman" panose="02020603050405020304" pitchFamily="18" charset="0"/>
+              </a:rPr>
+              <a:t> </a:t>
+            </a:r>
+            <a:r>
+              <a:rPr lang="en-US" dirty="0" smtClean="0">
+                <a:latin typeface="Times New Roman" panose="02020603050405020304" pitchFamily="18" charset="0"/>
+                <a:cs typeface="Times New Roman" panose="02020603050405020304" pitchFamily="18" charset="0"/>
+              </a:rPr>
+              <a:t>– flag (if set, this command is immediate, next one is 32 bit data );</a:t>
+            </a:r>
+          </a:p>
+          <a:p>
+            <a:r>
+              <a:rPr lang="en-US" dirty="0">
+                <a:latin typeface="Times New Roman" panose="02020603050405020304" pitchFamily="18" charset="0"/>
+                <a:cs typeface="Times New Roman" panose="02020603050405020304" pitchFamily="18" charset="0"/>
+              </a:rPr>
+              <a:t>I-type </a:t>
+            </a:r>
+            <a:r>
+              <a:rPr lang="en-US" dirty="0" smtClean="0">
+                <a:latin typeface="Times New Roman" panose="02020603050405020304" pitchFamily="18" charset="0"/>
+                <a:cs typeface="Times New Roman" panose="02020603050405020304" pitchFamily="18" charset="0"/>
+              </a:rPr>
+              <a:t>commands don’t use R2 field;</a:t>
             </a:r>
             <a:endParaRPr lang="ru-RU" dirty="0">
               <a:latin typeface="Times New Roman" panose="02020603050405020304" pitchFamily="18" charset="0"/>
@@ -6094,10 +6555,1307 @@
           </a:p>
         </p:txBody>
       </p:sp>
+      <p:sp>
+        <p:nvSpPr>
+          <p:cNvPr id="20" name="Rectangle 19"/>
+          <p:cNvSpPr/>
+          <p:nvPr/>
+        </p:nvSpPr>
+        <p:spPr>
+          <a:xfrm>
+            <a:off x="2152071" y="2286555"/>
+            <a:ext cx="1290780" cy="455424"/>
+          </a:xfrm>
+          <a:prstGeom prst="rect">
+            <a:avLst/>
+          </a:prstGeom>
+          <a:noFill/>
+          <a:ln w="25400">
+            <a:solidFill>
+              <a:schemeClr val="tx1"/>
+            </a:solidFill>
+          </a:ln>
+        </p:spPr>
+        <p:style>
+          <a:lnRef idx="2">
+            <a:schemeClr val="accent1">
+              <a:shade val="50000"/>
+            </a:schemeClr>
+          </a:lnRef>
+          <a:fillRef idx="1">
+            <a:schemeClr val="accent1"/>
+          </a:fillRef>
+          <a:effectRef idx="0">
+            <a:schemeClr val="accent1"/>
+          </a:effectRef>
+          <a:fontRef idx="minor">
+            <a:schemeClr val="lt1"/>
+          </a:fontRef>
+        </p:style>
+        <p:txBody>
+          <a:bodyPr rtlCol="0" anchor="ctr"/>
+          <a:lstStyle/>
+          <a:p>
+            <a:pPr algn="ctr"/>
+            <a:r>
+              <a:rPr lang="ru-RU" dirty="0" smtClean="0">
+                <a:solidFill>
+                  <a:schemeClr val="tx1"/>
+                </a:solidFill>
+              </a:rPr>
+              <a:t>2</a:t>
+            </a:r>
+            <a:r>
+              <a:rPr lang="en-US" dirty="0" smtClean="0">
+                <a:solidFill>
+                  <a:schemeClr val="tx1"/>
+                </a:solidFill>
+              </a:rPr>
+              <a:t>7 -- </a:t>
+            </a:r>
+            <a:r>
+              <a:rPr lang="ru-RU" dirty="0" smtClean="0">
+                <a:solidFill>
+                  <a:schemeClr val="tx1"/>
+                </a:solidFill>
+              </a:rPr>
+              <a:t>2</a:t>
+            </a:r>
+            <a:r>
+              <a:rPr lang="en-US" dirty="0" smtClean="0">
+                <a:solidFill>
+                  <a:schemeClr val="tx1"/>
+                </a:solidFill>
+              </a:rPr>
+              <a:t>4</a:t>
+            </a:r>
+            <a:endParaRPr lang="ru-RU" dirty="0">
+              <a:solidFill>
+                <a:schemeClr val="tx1"/>
+              </a:solidFill>
+            </a:endParaRPr>
+          </a:p>
+        </p:txBody>
+      </p:sp>
+      <p:sp>
+        <p:nvSpPr>
+          <p:cNvPr id="23" name="TextBox 22"/>
+          <p:cNvSpPr txBox="1"/>
+          <p:nvPr/>
+        </p:nvSpPr>
+        <p:spPr>
+          <a:xfrm>
+            <a:off x="535707" y="1833602"/>
+            <a:ext cx="272472" cy="369332"/>
+          </a:xfrm>
+          <a:prstGeom prst="rect">
+            <a:avLst/>
+          </a:prstGeom>
+          <a:noFill/>
+        </p:spPr>
+        <p:txBody>
+          <a:bodyPr wrap="square" rtlCol="0">
+            <a:spAutoFit/>
+          </a:bodyPr>
+          <a:lstStyle/>
+          <a:p>
+            <a:r>
+              <a:rPr lang="en-US" dirty="0"/>
+              <a:t>1</a:t>
+            </a:r>
+            <a:endParaRPr lang="ru-RU" dirty="0"/>
+          </a:p>
+        </p:txBody>
+      </p:sp>
+      <p:sp>
+        <p:nvSpPr>
+          <p:cNvPr id="25" name="TextBox 24"/>
+          <p:cNvSpPr txBox="1"/>
+          <p:nvPr/>
+        </p:nvSpPr>
+        <p:spPr>
+          <a:xfrm>
+            <a:off x="1364826" y="1833602"/>
+            <a:ext cx="272472" cy="369332"/>
+          </a:xfrm>
+          <a:prstGeom prst="rect">
+            <a:avLst/>
+          </a:prstGeom>
+          <a:noFill/>
+        </p:spPr>
+        <p:txBody>
+          <a:bodyPr wrap="square" rtlCol="0">
+            <a:spAutoFit/>
+          </a:bodyPr>
+          <a:lstStyle/>
+          <a:p>
+            <a:r>
+              <a:rPr lang="en-US" dirty="0"/>
+              <a:t>3</a:t>
+            </a:r>
+            <a:endParaRPr lang="ru-RU" dirty="0"/>
+          </a:p>
+        </p:txBody>
+      </p:sp>
+      <p:sp>
+        <p:nvSpPr>
+          <p:cNvPr id="26" name="TextBox 25"/>
+          <p:cNvSpPr txBox="1"/>
+          <p:nvPr/>
+        </p:nvSpPr>
+        <p:spPr>
+          <a:xfrm>
+            <a:off x="2660082" y="1806409"/>
+            <a:ext cx="272472" cy="369332"/>
+          </a:xfrm>
+          <a:prstGeom prst="rect">
+            <a:avLst/>
+          </a:prstGeom>
+          <a:noFill/>
+        </p:spPr>
+        <p:txBody>
+          <a:bodyPr wrap="square" rtlCol="0">
+            <a:spAutoFit/>
+          </a:bodyPr>
+          <a:lstStyle/>
+          <a:p>
+            <a:r>
+              <a:rPr lang="en-US" dirty="0" smtClean="0"/>
+              <a:t>4</a:t>
+            </a:r>
+            <a:endParaRPr lang="ru-RU" dirty="0"/>
+          </a:p>
+        </p:txBody>
+      </p:sp>
+      <p:sp>
+        <p:nvSpPr>
+          <p:cNvPr id="27" name="Left Brace 26"/>
+          <p:cNvSpPr/>
+          <p:nvPr/>
+        </p:nvSpPr>
+        <p:spPr>
+          <a:xfrm>
+            <a:off x="2085360" y="1686588"/>
+            <a:ext cx="221189" cy="2488012"/>
+          </a:xfrm>
+          <a:prstGeom prst="leftBrace">
+            <a:avLst/>
+          </a:prstGeom>
+          <a:ln w="12700" cmpd="sng"/>
+          <a:scene3d>
+            <a:camera prst="orthographicFront">
+              <a:rot lat="0" lon="0" rev="5400000"/>
+            </a:camera>
+            <a:lightRig rig="threePt" dir="t"/>
+          </a:scene3d>
+        </p:spPr>
+        <p:style>
+          <a:lnRef idx="1">
+            <a:schemeClr val="accent1"/>
+          </a:lnRef>
+          <a:fillRef idx="0">
+            <a:schemeClr val="accent1"/>
+          </a:fillRef>
+          <a:effectRef idx="0">
+            <a:schemeClr val="accent1"/>
+          </a:effectRef>
+          <a:fontRef idx="minor">
+            <a:schemeClr val="tx1"/>
+          </a:fontRef>
+        </p:style>
+        <p:txBody>
+          <a:bodyPr rtlCol="0" anchor="ctr"/>
+          <a:lstStyle/>
+          <a:p>
+            <a:pPr algn="ctr"/>
+            <a:endParaRPr lang="ru-RU"/>
+          </a:p>
+        </p:txBody>
+      </p:sp>
+      <p:cxnSp>
+        <p:nvCxnSpPr>
+          <p:cNvPr id="29" name="Straight Arrow Connector 28"/>
+          <p:cNvCxnSpPr/>
+          <p:nvPr/>
+        </p:nvCxnSpPr>
+        <p:spPr>
+          <a:xfrm>
+            <a:off x="2170991" y="3097579"/>
+            <a:ext cx="9501" cy="1138359"/>
+          </a:xfrm>
+          <a:prstGeom prst="straightConnector1">
+            <a:avLst/>
+          </a:prstGeom>
+          <a:ln>
+            <a:tailEnd type="triangle"/>
+          </a:ln>
+        </p:spPr>
+        <p:style>
+          <a:lnRef idx="1">
+            <a:schemeClr val="accent1"/>
+          </a:lnRef>
+          <a:fillRef idx="0">
+            <a:schemeClr val="accent1"/>
+          </a:fillRef>
+          <a:effectRef idx="0">
+            <a:schemeClr val="accent1"/>
+          </a:effectRef>
+          <a:fontRef idx="minor">
+            <a:schemeClr val="tx1"/>
+          </a:fontRef>
+        </p:style>
+      </p:cxnSp>
+      <p:sp>
+        <p:nvSpPr>
+          <p:cNvPr id="31" name="TextBox 30"/>
+          <p:cNvSpPr txBox="1"/>
+          <p:nvPr/>
+        </p:nvSpPr>
+        <p:spPr>
+          <a:xfrm>
+            <a:off x="535707" y="4456214"/>
+            <a:ext cx="6082148" cy="646331"/>
+          </a:xfrm>
+          <a:prstGeom prst="rect">
+            <a:avLst/>
+          </a:prstGeom>
+          <a:noFill/>
+        </p:spPr>
+        <p:txBody>
+          <a:bodyPr wrap="square" rtlCol="0">
+            <a:spAutoFit/>
+          </a:bodyPr>
+          <a:lstStyle/>
+          <a:p>
+            <a:r>
+              <a:rPr lang="en-US" dirty="0" smtClean="0">
+                <a:latin typeface="Times New Roman" panose="02020603050405020304" pitchFamily="18" charset="0"/>
+                <a:cs typeface="Times New Roman" panose="02020603050405020304" pitchFamily="18" charset="0"/>
+              </a:rPr>
+              <a:t>Full op code (3 bit for pipe id and 4 for real op code)</a:t>
+            </a:r>
+          </a:p>
+          <a:p>
+            <a:r>
+              <a:rPr lang="en-US" dirty="0">
+                <a:latin typeface="Times New Roman" panose="02020603050405020304" pitchFamily="18" charset="0"/>
+                <a:cs typeface="Times New Roman" panose="02020603050405020304" pitchFamily="18" charset="0"/>
+              </a:rPr>
+              <a:t>For </a:t>
+            </a:r>
+            <a:r>
+              <a:rPr lang="en-US" dirty="0" smtClean="0">
+                <a:latin typeface="Times New Roman" panose="02020603050405020304" pitchFamily="18" charset="0"/>
+                <a:cs typeface="Times New Roman" panose="02020603050405020304" pitchFamily="18" charset="0"/>
+              </a:rPr>
+              <a:t>CTR</a:t>
+            </a:r>
+            <a:r>
+              <a:rPr lang="en-US" dirty="0" smtClean="0">
+                <a:latin typeface="Times New Roman" panose="02020603050405020304" pitchFamily="18" charset="0"/>
+                <a:cs typeface="Times New Roman" panose="02020603050405020304" pitchFamily="18" charset="0"/>
+              </a:rPr>
+              <a:t> </a:t>
+            </a:r>
+            <a:r>
+              <a:rPr lang="en-US" dirty="0" smtClean="0">
+                <a:latin typeface="Times New Roman" panose="02020603050405020304" pitchFamily="18" charset="0"/>
+                <a:cs typeface="Times New Roman" panose="02020603050405020304" pitchFamily="18" charset="0"/>
+              </a:rPr>
+              <a:t>instructions 30—28 </a:t>
+            </a:r>
+            <a:r>
+              <a:rPr lang="en-US" dirty="0">
+                <a:latin typeface="Times New Roman" panose="02020603050405020304" pitchFamily="18" charset="0"/>
+                <a:cs typeface="Times New Roman" panose="02020603050405020304" pitchFamily="18" charset="0"/>
+              </a:rPr>
+              <a:t>bits are equal to </a:t>
+            </a:r>
+            <a:r>
+              <a:rPr lang="en-US" b="1" u="sng" dirty="0">
+                <a:latin typeface="Times New Roman" panose="02020603050405020304" pitchFamily="18" charset="0"/>
+                <a:cs typeface="Times New Roman" panose="02020603050405020304" pitchFamily="18" charset="0"/>
+              </a:rPr>
+              <a:t>“</a:t>
+            </a:r>
+            <a:r>
+              <a:rPr lang="en-US" b="1" u="sng" dirty="0" smtClean="0">
+                <a:latin typeface="Times New Roman" panose="02020603050405020304" pitchFamily="18" charset="0"/>
+                <a:cs typeface="Times New Roman" panose="02020603050405020304" pitchFamily="18" charset="0"/>
+              </a:rPr>
+              <a:t>001”</a:t>
+            </a:r>
+            <a:endParaRPr lang="ru-RU" b="1" u="sng" dirty="0">
+              <a:latin typeface="Times New Roman" panose="02020603050405020304" pitchFamily="18" charset="0"/>
+              <a:cs typeface="Times New Roman" panose="02020603050405020304" pitchFamily="18" charset="0"/>
+            </a:endParaRPr>
+          </a:p>
+        </p:txBody>
+      </p:sp>
+      <p:sp>
+        <p:nvSpPr>
+          <p:cNvPr id="32" name="Rectangle 31"/>
+          <p:cNvSpPr/>
+          <p:nvPr/>
+        </p:nvSpPr>
+        <p:spPr>
+          <a:xfrm>
+            <a:off x="3445162" y="2290618"/>
+            <a:ext cx="1221513" cy="450140"/>
+          </a:xfrm>
+          <a:prstGeom prst="rect">
+            <a:avLst/>
+          </a:prstGeom>
+          <a:noFill/>
+          <a:ln w="25400">
+            <a:solidFill>
+              <a:schemeClr val="tx1"/>
+            </a:solidFill>
+          </a:ln>
+        </p:spPr>
+        <p:style>
+          <a:lnRef idx="2">
+            <a:schemeClr val="accent1">
+              <a:shade val="50000"/>
+            </a:schemeClr>
+          </a:lnRef>
+          <a:fillRef idx="1">
+            <a:schemeClr val="accent1"/>
+          </a:fillRef>
+          <a:effectRef idx="0">
+            <a:schemeClr val="accent1"/>
+          </a:effectRef>
+          <a:fontRef idx="minor">
+            <a:schemeClr val="lt1"/>
+          </a:fontRef>
+        </p:style>
+        <p:txBody>
+          <a:bodyPr rtlCol="0" anchor="ctr"/>
+          <a:lstStyle/>
+          <a:p>
+            <a:pPr algn="ctr"/>
+            <a:r>
+              <a:rPr lang="ru-RU" dirty="0" smtClean="0">
+                <a:solidFill>
+                  <a:schemeClr val="tx1"/>
+                </a:solidFill>
+              </a:rPr>
+              <a:t>2</a:t>
+            </a:r>
+            <a:r>
+              <a:rPr lang="en-US" dirty="0" smtClean="0">
+                <a:solidFill>
+                  <a:schemeClr val="tx1"/>
+                </a:solidFill>
+              </a:rPr>
+              <a:t>3 </a:t>
+            </a:r>
+            <a:r>
+              <a:rPr lang="ru-RU" dirty="0" smtClean="0">
+                <a:solidFill>
+                  <a:schemeClr val="tx1"/>
+                </a:solidFill>
+              </a:rPr>
+              <a:t>-</a:t>
+            </a:r>
+            <a:r>
+              <a:rPr lang="en-US" dirty="0" smtClean="0">
+                <a:solidFill>
+                  <a:schemeClr val="tx1"/>
+                </a:solidFill>
+              </a:rPr>
+              <a:t>- </a:t>
+            </a:r>
+            <a:r>
+              <a:rPr lang="ru-RU" dirty="0" smtClean="0">
+                <a:solidFill>
+                  <a:schemeClr val="tx1"/>
+                </a:solidFill>
+              </a:rPr>
+              <a:t>2</a:t>
+            </a:r>
+            <a:r>
+              <a:rPr lang="en-US" dirty="0">
+                <a:solidFill>
+                  <a:schemeClr val="tx1"/>
+                </a:solidFill>
+              </a:rPr>
+              <a:t>0</a:t>
+            </a:r>
+            <a:endParaRPr lang="ru-RU" dirty="0">
+              <a:solidFill>
+                <a:schemeClr val="tx1"/>
+              </a:solidFill>
+            </a:endParaRPr>
+          </a:p>
+        </p:txBody>
+      </p:sp>
+      <p:sp>
+        <p:nvSpPr>
+          <p:cNvPr id="33" name="Rectangle 32"/>
+          <p:cNvSpPr/>
+          <p:nvPr/>
+        </p:nvSpPr>
+        <p:spPr>
+          <a:xfrm>
+            <a:off x="4666675" y="2286555"/>
+            <a:ext cx="1249207" cy="454203"/>
+          </a:xfrm>
+          <a:prstGeom prst="rect">
+            <a:avLst/>
+          </a:prstGeom>
+          <a:noFill/>
+          <a:ln w="25400">
+            <a:solidFill>
+              <a:schemeClr val="tx1"/>
+            </a:solidFill>
+          </a:ln>
+        </p:spPr>
+        <p:style>
+          <a:lnRef idx="2">
+            <a:schemeClr val="accent1">
+              <a:shade val="50000"/>
+            </a:schemeClr>
+          </a:lnRef>
+          <a:fillRef idx="1">
+            <a:schemeClr val="accent1"/>
+          </a:fillRef>
+          <a:effectRef idx="0">
+            <a:schemeClr val="accent1"/>
+          </a:effectRef>
+          <a:fontRef idx="minor">
+            <a:schemeClr val="lt1"/>
+          </a:fontRef>
+        </p:style>
+        <p:txBody>
+          <a:bodyPr rtlCol="0" anchor="ctr"/>
+          <a:lstStyle/>
+          <a:p>
+            <a:pPr algn="ctr"/>
+            <a:r>
+              <a:rPr lang="en-US" dirty="0" smtClean="0">
+                <a:solidFill>
+                  <a:schemeClr val="tx1"/>
+                </a:solidFill>
+              </a:rPr>
+              <a:t>19 </a:t>
+            </a:r>
+            <a:r>
+              <a:rPr lang="ru-RU" dirty="0" smtClean="0">
+                <a:solidFill>
+                  <a:schemeClr val="tx1"/>
+                </a:solidFill>
+              </a:rPr>
+              <a:t>-</a:t>
+            </a:r>
+            <a:r>
+              <a:rPr lang="en-US" dirty="0" smtClean="0">
+                <a:solidFill>
+                  <a:schemeClr val="tx1"/>
+                </a:solidFill>
+              </a:rPr>
+              <a:t>- 17</a:t>
+            </a:r>
+            <a:endParaRPr lang="ru-RU" dirty="0">
+              <a:solidFill>
+                <a:schemeClr val="tx1"/>
+              </a:solidFill>
+            </a:endParaRPr>
+          </a:p>
+        </p:txBody>
+      </p:sp>
+      <p:sp>
+        <p:nvSpPr>
+          <p:cNvPr id="34" name="Rectangle 33"/>
+          <p:cNvSpPr/>
+          <p:nvPr/>
+        </p:nvSpPr>
+        <p:spPr>
+          <a:xfrm>
+            <a:off x="5915882" y="2293605"/>
+            <a:ext cx="1221513" cy="447153"/>
+          </a:xfrm>
+          <a:prstGeom prst="rect">
+            <a:avLst/>
+          </a:prstGeom>
+          <a:noFill/>
+          <a:ln w="25400">
+            <a:solidFill>
+              <a:schemeClr val="tx1"/>
+            </a:solidFill>
+          </a:ln>
+        </p:spPr>
+        <p:style>
+          <a:lnRef idx="2">
+            <a:schemeClr val="accent1">
+              <a:shade val="50000"/>
+            </a:schemeClr>
+          </a:lnRef>
+          <a:fillRef idx="1">
+            <a:schemeClr val="accent1"/>
+          </a:fillRef>
+          <a:effectRef idx="0">
+            <a:schemeClr val="accent1"/>
+          </a:effectRef>
+          <a:fontRef idx="minor">
+            <a:schemeClr val="lt1"/>
+          </a:fontRef>
+        </p:style>
+        <p:txBody>
+          <a:bodyPr rtlCol="0" anchor="ctr"/>
+          <a:lstStyle/>
+          <a:p>
+            <a:pPr algn="ctr"/>
+            <a:r>
+              <a:rPr lang="en-US" dirty="0" smtClean="0">
+                <a:solidFill>
+                  <a:schemeClr val="tx1"/>
+                </a:solidFill>
+              </a:rPr>
+              <a:t>16 </a:t>
+            </a:r>
+            <a:r>
+              <a:rPr lang="ru-RU" dirty="0" smtClean="0">
+                <a:solidFill>
+                  <a:schemeClr val="tx1"/>
+                </a:solidFill>
+              </a:rPr>
+              <a:t>-</a:t>
+            </a:r>
+            <a:r>
+              <a:rPr lang="en-US" dirty="0" smtClean="0">
+                <a:solidFill>
+                  <a:schemeClr val="tx1"/>
+                </a:solidFill>
+              </a:rPr>
+              <a:t>- 13</a:t>
+            </a:r>
+            <a:endParaRPr lang="ru-RU" dirty="0">
+              <a:solidFill>
+                <a:schemeClr val="tx1"/>
+              </a:solidFill>
+            </a:endParaRPr>
+          </a:p>
+        </p:txBody>
+      </p:sp>
+      <p:sp>
+        <p:nvSpPr>
+          <p:cNvPr id="35" name="TextBox 34"/>
+          <p:cNvSpPr txBox="1"/>
+          <p:nvPr/>
+        </p:nvSpPr>
+        <p:spPr>
+          <a:xfrm>
+            <a:off x="3904677" y="1822550"/>
+            <a:ext cx="272472" cy="369332"/>
+          </a:xfrm>
+          <a:prstGeom prst="rect">
+            <a:avLst/>
+          </a:prstGeom>
+          <a:noFill/>
+        </p:spPr>
+        <p:txBody>
+          <a:bodyPr wrap="square" rtlCol="0">
+            <a:spAutoFit/>
+          </a:bodyPr>
+          <a:lstStyle/>
+          <a:p>
+            <a:r>
+              <a:rPr lang="en-US" dirty="0"/>
+              <a:t>4</a:t>
+            </a:r>
+            <a:endParaRPr lang="ru-RU" dirty="0"/>
+          </a:p>
+        </p:txBody>
+      </p:sp>
+      <p:sp>
+        <p:nvSpPr>
+          <p:cNvPr id="36" name="TextBox 35"/>
+          <p:cNvSpPr txBox="1"/>
+          <p:nvPr/>
+        </p:nvSpPr>
+        <p:spPr>
+          <a:xfrm>
+            <a:off x="5149272" y="1822550"/>
+            <a:ext cx="272472" cy="369332"/>
+          </a:xfrm>
+          <a:prstGeom prst="rect">
+            <a:avLst/>
+          </a:prstGeom>
+          <a:noFill/>
+        </p:spPr>
+        <p:txBody>
+          <a:bodyPr wrap="square" rtlCol="0">
+            <a:spAutoFit/>
+          </a:bodyPr>
+          <a:lstStyle/>
+          <a:p>
+            <a:r>
+              <a:rPr lang="en-US" dirty="0"/>
+              <a:t>4</a:t>
+            </a:r>
+            <a:endParaRPr lang="ru-RU" dirty="0"/>
+          </a:p>
+        </p:txBody>
+      </p:sp>
+      <p:sp>
+        <p:nvSpPr>
+          <p:cNvPr id="37" name="TextBox 36"/>
+          <p:cNvSpPr txBox="1"/>
+          <p:nvPr/>
+        </p:nvSpPr>
+        <p:spPr>
+          <a:xfrm>
+            <a:off x="6331527" y="1822550"/>
+            <a:ext cx="272472" cy="369332"/>
+          </a:xfrm>
+          <a:prstGeom prst="rect">
+            <a:avLst/>
+          </a:prstGeom>
+          <a:noFill/>
+        </p:spPr>
+        <p:txBody>
+          <a:bodyPr wrap="square" rtlCol="0">
+            <a:spAutoFit/>
+          </a:bodyPr>
+          <a:lstStyle/>
+          <a:p>
+            <a:r>
+              <a:rPr lang="en-US" dirty="0"/>
+              <a:t>4</a:t>
+            </a:r>
+            <a:endParaRPr lang="ru-RU" dirty="0"/>
+          </a:p>
+        </p:txBody>
+      </p:sp>
+      <p:sp>
+        <p:nvSpPr>
+          <p:cNvPr id="38" name="Rectangle 37"/>
+          <p:cNvSpPr/>
+          <p:nvPr/>
+        </p:nvSpPr>
+        <p:spPr>
+          <a:xfrm>
+            <a:off x="7137395" y="2289797"/>
+            <a:ext cx="2473031" cy="454203"/>
+          </a:xfrm>
+          <a:prstGeom prst="rect">
+            <a:avLst/>
+          </a:prstGeom>
+          <a:noFill/>
+          <a:ln w="25400">
+            <a:solidFill>
+              <a:schemeClr val="tx1"/>
+            </a:solidFill>
+          </a:ln>
+        </p:spPr>
+        <p:style>
+          <a:lnRef idx="2">
+            <a:schemeClr val="accent1">
+              <a:shade val="50000"/>
+            </a:schemeClr>
+          </a:lnRef>
+          <a:fillRef idx="1">
+            <a:schemeClr val="accent1"/>
+          </a:fillRef>
+          <a:effectRef idx="0">
+            <a:schemeClr val="accent1"/>
+          </a:effectRef>
+          <a:fontRef idx="minor">
+            <a:schemeClr val="lt1"/>
+          </a:fontRef>
+        </p:style>
+        <p:txBody>
+          <a:bodyPr rtlCol="0" anchor="ctr"/>
+          <a:lstStyle/>
+          <a:p>
+            <a:pPr algn="ctr"/>
+            <a:r>
+              <a:rPr lang="en-US" dirty="0" smtClean="0">
+                <a:solidFill>
+                  <a:schemeClr val="tx1"/>
+                </a:solidFill>
+              </a:rPr>
+              <a:t>12 </a:t>
+            </a:r>
+            <a:r>
+              <a:rPr lang="en-US" dirty="0" smtClean="0">
+                <a:solidFill>
+                  <a:schemeClr val="tx1"/>
+                </a:solidFill>
+              </a:rPr>
+              <a:t>-</a:t>
+            </a:r>
+            <a:r>
+              <a:rPr lang="ru-RU" dirty="0" smtClean="0">
+                <a:solidFill>
+                  <a:schemeClr val="tx1"/>
+                </a:solidFill>
+              </a:rPr>
+              <a:t>-</a:t>
+            </a:r>
+            <a:r>
+              <a:rPr lang="en-US" dirty="0" smtClean="0">
+                <a:solidFill>
+                  <a:schemeClr val="tx1"/>
+                </a:solidFill>
+              </a:rPr>
+              <a:t> 5</a:t>
+            </a:r>
+            <a:endParaRPr lang="ru-RU" dirty="0">
+              <a:solidFill>
+                <a:schemeClr val="tx1"/>
+              </a:solidFill>
+            </a:endParaRPr>
+          </a:p>
+        </p:txBody>
+      </p:sp>
+      <p:sp>
+        <p:nvSpPr>
+          <p:cNvPr id="40" name="Rectangle 39"/>
+          <p:cNvSpPr/>
+          <p:nvPr/>
+        </p:nvSpPr>
+        <p:spPr>
+          <a:xfrm>
+            <a:off x="9610426" y="2293605"/>
+            <a:ext cx="1436265" cy="447153"/>
+          </a:xfrm>
+          <a:prstGeom prst="rect">
+            <a:avLst/>
+          </a:prstGeom>
+          <a:noFill/>
+          <a:ln w="25400">
+            <a:solidFill>
+              <a:schemeClr val="tx1"/>
+            </a:solidFill>
+          </a:ln>
+        </p:spPr>
+        <p:style>
+          <a:lnRef idx="2">
+            <a:schemeClr val="accent1">
+              <a:shade val="50000"/>
+            </a:schemeClr>
+          </a:lnRef>
+          <a:fillRef idx="1">
+            <a:schemeClr val="accent1"/>
+          </a:fillRef>
+          <a:effectRef idx="0">
+            <a:schemeClr val="accent1"/>
+          </a:effectRef>
+          <a:fontRef idx="minor">
+            <a:schemeClr val="lt1"/>
+          </a:fontRef>
+        </p:style>
+        <p:txBody>
+          <a:bodyPr rtlCol="0" anchor="ctr"/>
+          <a:lstStyle/>
+          <a:p>
+            <a:pPr algn="ctr"/>
+            <a:r>
+              <a:rPr lang="en-US" dirty="0">
+                <a:solidFill>
+                  <a:schemeClr val="tx1"/>
+                </a:solidFill>
+              </a:rPr>
+              <a:t>4</a:t>
+            </a:r>
+            <a:r>
+              <a:rPr lang="ru-RU" dirty="0" smtClean="0">
+                <a:solidFill>
+                  <a:schemeClr val="tx1"/>
+                </a:solidFill>
+              </a:rPr>
+              <a:t>-</a:t>
+            </a:r>
+            <a:r>
+              <a:rPr lang="en-US" dirty="0">
+                <a:solidFill>
+                  <a:schemeClr val="tx1"/>
+                </a:solidFill>
+              </a:rPr>
+              <a:t>0</a:t>
+            </a:r>
+            <a:endParaRPr lang="ru-RU" dirty="0">
+              <a:solidFill>
+                <a:schemeClr val="tx1"/>
+              </a:solidFill>
+            </a:endParaRPr>
+          </a:p>
+        </p:txBody>
+      </p:sp>
+      <p:sp>
+        <p:nvSpPr>
+          <p:cNvPr id="41" name="TextBox 40"/>
+          <p:cNvSpPr txBox="1"/>
+          <p:nvPr/>
+        </p:nvSpPr>
+        <p:spPr>
+          <a:xfrm>
+            <a:off x="10192322" y="1820869"/>
+            <a:ext cx="272472" cy="369332"/>
+          </a:xfrm>
+          <a:prstGeom prst="rect">
+            <a:avLst/>
+          </a:prstGeom>
+          <a:noFill/>
+        </p:spPr>
+        <p:txBody>
+          <a:bodyPr wrap="square" rtlCol="0">
+            <a:spAutoFit/>
+          </a:bodyPr>
+          <a:lstStyle/>
+          <a:p>
+            <a:r>
+              <a:rPr lang="en-US" dirty="0"/>
+              <a:t>4</a:t>
+            </a:r>
+            <a:endParaRPr lang="ru-RU" dirty="0"/>
+          </a:p>
+        </p:txBody>
+      </p:sp>
+      <p:sp>
+        <p:nvSpPr>
+          <p:cNvPr id="42" name="TextBox 41"/>
+          <p:cNvSpPr txBox="1"/>
+          <p:nvPr/>
+        </p:nvSpPr>
+        <p:spPr>
+          <a:xfrm>
+            <a:off x="3576781" y="2898777"/>
+            <a:ext cx="8264595" cy="369332"/>
+          </a:xfrm>
+          <a:prstGeom prst="rect">
+            <a:avLst/>
+          </a:prstGeom>
+          <a:noFill/>
+        </p:spPr>
+        <p:txBody>
+          <a:bodyPr wrap="square" rtlCol="0">
+            <a:spAutoFit/>
+          </a:bodyPr>
+          <a:lstStyle/>
+          <a:p>
+            <a:r>
+              <a:rPr lang="en-US" dirty="0"/>
+              <a:t>n</a:t>
+            </a:r>
+            <a:r>
+              <a:rPr lang="en-US" dirty="0" smtClean="0"/>
+              <a:t>ot used</a:t>
+            </a:r>
+            <a:r>
+              <a:rPr lang="en-US" dirty="0"/>
+              <a:t> </a:t>
+            </a:r>
+            <a:r>
+              <a:rPr lang="en-US" dirty="0" smtClean="0"/>
+              <a:t>       not </a:t>
+            </a:r>
+            <a:r>
+              <a:rPr lang="en-US" dirty="0"/>
+              <a:t>used            </a:t>
+            </a:r>
+            <a:r>
+              <a:rPr lang="en-US" dirty="0" smtClean="0"/>
+              <a:t> </a:t>
+            </a:r>
+            <a:r>
+              <a:rPr lang="en-US" dirty="0" smtClean="0"/>
+              <a:t>R2                           not </a:t>
+            </a:r>
+            <a:r>
+              <a:rPr lang="en-US" dirty="0" smtClean="0"/>
+              <a:t>used                </a:t>
+            </a:r>
+            <a:r>
+              <a:rPr lang="en-US" dirty="0" smtClean="0"/>
+              <a:t>   cond</a:t>
+            </a:r>
+            <a:r>
+              <a:rPr lang="en-US" dirty="0" smtClean="0"/>
+              <a:t>. flags</a:t>
+            </a:r>
+            <a:endParaRPr lang="ru-RU" dirty="0"/>
+          </a:p>
+        </p:txBody>
+      </p:sp>
+      <p:sp>
+        <p:nvSpPr>
+          <p:cNvPr id="50" name="TextBox 49"/>
+          <p:cNvSpPr txBox="1"/>
+          <p:nvPr/>
+        </p:nvSpPr>
+        <p:spPr>
+          <a:xfrm>
+            <a:off x="535706" y="5580185"/>
+            <a:ext cx="11437463" cy="923330"/>
+          </a:xfrm>
+          <a:prstGeom prst="rect">
+            <a:avLst/>
+          </a:prstGeom>
+          <a:noFill/>
+        </p:spPr>
+        <p:txBody>
+          <a:bodyPr wrap="square" rtlCol="0">
+            <a:spAutoFit/>
+          </a:bodyPr>
+          <a:lstStyle/>
+          <a:p>
+            <a:r>
+              <a:rPr lang="pt-BR" dirty="0">
+                <a:latin typeface="Courier New" panose="02070309020205020404" pitchFamily="49" charset="0"/>
+                <a:cs typeface="Courier New" panose="02070309020205020404" pitchFamily="49" charset="0"/>
+              </a:rPr>
+              <a:t>r, 0, c, jmp, </a:t>
+            </a:r>
+            <a:r>
+              <a:rPr lang="pt-BR" dirty="0" smtClean="0">
+                <a:latin typeface="Courier New" panose="02070309020205020404" pitchFamily="49" charset="0"/>
+                <a:cs typeface="Courier New" panose="02070309020205020404" pitchFamily="49" charset="0"/>
+              </a:rPr>
+              <a:t>RX, RX, R7               // goto </a:t>
+            </a:r>
+            <a:r>
+              <a:rPr lang="pt-BR" dirty="0">
+                <a:latin typeface="Courier New" panose="02070309020205020404" pitchFamily="49" charset="0"/>
+                <a:cs typeface="Courier New" panose="02070309020205020404" pitchFamily="49" charset="0"/>
+              </a:rPr>
+              <a:t>inst</a:t>
+            </a:r>
+            <a:r>
+              <a:rPr lang="pt-BR" dirty="0" smtClean="0">
+                <a:latin typeface="Courier New" panose="02070309020205020404" pitchFamily="49" charset="0"/>
+                <a:cs typeface="Courier New" panose="02070309020205020404" pitchFamily="49" charset="0"/>
+              </a:rPr>
+              <a:t>. at [R7]         ; </a:t>
+            </a:r>
+            <a:r>
+              <a:rPr lang="pt-BR" dirty="0">
+                <a:latin typeface="Courier New" panose="02070309020205020404" pitchFamily="49" charset="0"/>
+                <a:cs typeface="Courier New" panose="02070309020205020404" pitchFamily="49" charset="0"/>
+              </a:rPr>
+              <a:t>RX not used</a:t>
+            </a:r>
+            <a:endParaRPr lang="pt-BR" dirty="0" smtClean="0">
+              <a:latin typeface="Courier New" panose="02070309020205020404" pitchFamily="49" charset="0"/>
+              <a:cs typeface="Courier New" panose="02070309020205020404" pitchFamily="49" charset="0"/>
+            </a:endParaRPr>
+          </a:p>
+          <a:p>
+            <a:r>
+              <a:rPr lang="pt-BR" dirty="0" smtClean="0">
+                <a:latin typeface="Courier New" panose="02070309020205020404" pitchFamily="49" charset="0"/>
+                <a:cs typeface="Courier New" panose="02070309020205020404" pitchFamily="49" charset="0"/>
+              </a:rPr>
+              <a:t>i</a:t>
+            </a:r>
+            <a:r>
+              <a:rPr lang="pt-BR" dirty="0">
+                <a:latin typeface="Courier New" panose="02070309020205020404" pitchFamily="49" charset="0"/>
+                <a:cs typeface="Courier New" panose="02070309020205020404" pitchFamily="49" charset="0"/>
+              </a:rPr>
+              <a:t>, 0, c, jmp, </a:t>
+            </a:r>
+            <a:r>
+              <a:rPr lang="pt-BR" dirty="0" smtClean="0">
+                <a:latin typeface="Courier New" panose="02070309020205020404" pitchFamily="49" charset="0"/>
+                <a:cs typeface="Courier New" panose="02070309020205020404" pitchFamily="49" charset="0"/>
+              </a:rPr>
+              <a:t>RX, RX, RX, </a:t>
+            </a:r>
+            <a:r>
+              <a:rPr lang="pt-BR" dirty="0">
+                <a:latin typeface="Courier New" panose="02070309020205020404" pitchFamily="49" charset="0"/>
+                <a:cs typeface="Courier New" panose="02070309020205020404" pitchFamily="49" charset="0"/>
+              </a:rPr>
+              <a:t>0, 0, if, </a:t>
+            </a:r>
+            <a:r>
+              <a:rPr lang="pt-BR" dirty="0" smtClean="0">
+                <a:latin typeface="Courier New" panose="02070309020205020404" pitchFamily="49" charset="0"/>
+                <a:cs typeface="Courier New" panose="02070309020205020404" pitchFamily="49" charset="0"/>
+              </a:rPr>
+              <a:t>le </a:t>
+            </a:r>
+            <a:r>
+              <a:rPr lang="pt-BR" dirty="0">
+                <a:latin typeface="Courier New" panose="02070309020205020404" pitchFamily="49" charset="0"/>
+                <a:cs typeface="Courier New" panose="02070309020205020404" pitchFamily="49" charset="0"/>
+              </a:rPr>
+              <a:t>// </a:t>
+            </a:r>
+            <a:r>
+              <a:rPr lang="pt-BR" dirty="0" smtClean="0">
+                <a:latin typeface="Courier New" panose="02070309020205020404" pitchFamily="49" charset="0"/>
+                <a:cs typeface="Courier New" panose="02070309020205020404" pitchFamily="49" charset="0"/>
+              </a:rPr>
+              <a:t>goto inst. #9 if less-equal; RX not used</a:t>
+            </a:r>
+            <a:endParaRPr lang="pt-BR" dirty="0">
+              <a:latin typeface="Courier New" panose="02070309020205020404" pitchFamily="49" charset="0"/>
+              <a:cs typeface="Courier New" panose="02070309020205020404" pitchFamily="49" charset="0"/>
+            </a:endParaRPr>
+          </a:p>
+          <a:p>
+            <a:r>
+              <a:rPr lang="pt-BR" dirty="0">
+                <a:latin typeface="Courier New" panose="02070309020205020404" pitchFamily="49" charset="0"/>
+                <a:cs typeface="Courier New" panose="02070309020205020404" pitchFamily="49" charset="0"/>
+              </a:rPr>
+              <a:t>di, 9 </a:t>
+            </a:r>
+            <a:endParaRPr lang="ru-RU" dirty="0">
+              <a:latin typeface="Courier New" panose="02070309020205020404" pitchFamily="49" charset="0"/>
+              <a:cs typeface="Courier New" panose="02070309020205020404" pitchFamily="49" charset="0"/>
+            </a:endParaRPr>
+          </a:p>
+        </p:txBody>
+      </p:sp>
+      <p:sp>
+        <p:nvSpPr>
+          <p:cNvPr id="51" name="TextBox 50"/>
+          <p:cNvSpPr txBox="1"/>
+          <p:nvPr/>
+        </p:nvSpPr>
+        <p:spPr>
+          <a:xfrm>
+            <a:off x="8218046" y="1830105"/>
+            <a:ext cx="272472" cy="369332"/>
+          </a:xfrm>
+          <a:prstGeom prst="rect">
+            <a:avLst/>
+          </a:prstGeom>
+          <a:noFill/>
+        </p:spPr>
+        <p:txBody>
+          <a:bodyPr wrap="square" rtlCol="0">
+            <a:spAutoFit/>
+          </a:bodyPr>
+          <a:lstStyle/>
+          <a:p>
+            <a:r>
+              <a:rPr lang="en-US" dirty="0" smtClean="0"/>
+              <a:t>8</a:t>
+            </a:r>
+            <a:endParaRPr lang="ru-RU" dirty="0"/>
+          </a:p>
+        </p:txBody>
+      </p:sp>
+      <p:cxnSp>
+        <p:nvCxnSpPr>
+          <p:cNvPr id="44" name="Straight Connector 43"/>
+          <p:cNvCxnSpPr/>
+          <p:nvPr/>
+        </p:nvCxnSpPr>
+        <p:spPr>
+          <a:xfrm>
+            <a:off x="7137394" y="2300655"/>
+            <a:ext cx="2470721" cy="440103"/>
+          </a:xfrm>
+          <a:prstGeom prst="line">
+            <a:avLst/>
+          </a:prstGeom>
+          <a:ln w="12700">
+            <a:solidFill>
+              <a:srgbClr val="FF0000"/>
+            </a:solidFill>
+          </a:ln>
+        </p:spPr>
+        <p:style>
+          <a:lnRef idx="1">
+            <a:schemeClr val="accent1"/>
+          </a:lnRef>
+          <a:fillRef idx="0">
+            <a:schemeClr val="accent1"/>
+          </a:fillRef>
+          <a:effectRef idx="0">
+            <a:schemeClr val="accent1"/>
+          </a:effectRef>
+          <a:fontRef idx="minor">
+            <a:schemeClr val="tx1"/>
+          </a:fontRef>
+        </p:style>
+      </p:cxnSp>
+      <p:cxnSp>
+        <p:nvCxnSpPr>
+          <p:cNvPr id="47" name="Straight Connector 46"/>
+          <p:cNvCxnSpPr/>
+          <p:nvPr/>
+        </p:nvCxnSpPr>
+        <p:spPr>
+          <a:xfrm flipV="1">
+            <a:off x="7137394" y="2319601"/>
+            <a:ext cx="2470721" cy="436937"/>
+          </a:xfrm>
+          <a:prstGeom prst="line">
+            <a:avLst/>
+          </a:prstGeom>
+          <a:ln w="12700">
+            <a:solidFill>
+              <a:srgbClr val="FF0000"/>
+            </a:solidFill>
+          </a:ln>
+        </p:spPr>
+        <p:style>
+          <a:lnRef idx="1">
+            <a:schemeClr val="accent1"/>
+          </a:lnRef>
+          <a:fillRef idx="0">
+            <a:schemeClr val="accent1"/>
+          </a:fillRef>
+          <a:effectRef idx="0">
+            <a:schemeClr val="accent1"/>
+          </a:effectRef>
+          <a:fontRef idx="minor">
+            <a:schemeClr val="tx1"/>
+          </a:fontRef>
+        </p:style>
+      </p:cxnSp>
+      <p:cxnSp>
+        <p:nvCxnSpPr>
+          <p:cNvPr id="49" name="Straight Connector 48"/>
+          <p:cNvCxnSpPr/>
+          <p:nvPr/>
+        </p:nvCxnSpPr>
+        <p:spPr>
+          <a:xfrm>
+            <a:off x="3436052" y="2290618"/>
+            <a:ext cx="1228311" cy="450140"/>
+          </a:xfrm>
+          <a:prstGeom prst="line">
+            <a:avLst/>
+          </a:prstGeom>
+          <a:ln w="12700">
+            <a:solidFill>
+              <a:srgbClr val="FF0000"/>
+            </a:solidFill>
+          </a:ln>
+        </p:spPr>
+        <p:style>
+          <a:lnRef idx="1">
+            <a:schemeClr val="accent1"/>
+          </a:lnRef>
+          <a:fillRef idx="0">
+            <a:schemeClr val="accent1"/>
+          </a:fillRef>
+          <a:effectRef idx="0">
+            <a:schemeClr val="accent1"/>
+          </a:effectRef>
+          <a:fontRef idx="minor">
+            <a:schemeClr val="tx1"/>
+          </a:fontRef>
+        </p:style>
+      </p:cxnSp>
+      <p:cxnSp>
+        <p:nvCxnSpPr>
+          <p:cNvPr id="52" name="Straight Connector 51"/>
+          <p:cNvCxnSpPr/>
+          <p:nvPr/>
+        </p:nvCxnSpPr>
+        <p:spPr>
+          <a:xfrm flipV="1">
+            <a:off x="3429252" y="2300655"/>
+            <a:ext cx="1207412" cy="440104"/>
+          </a:xfrm>
+          <a:prstGeom prst="line">
+            <a:avLst/>
+          </a:prstGeom>
+          <a:ln w="12700">
+            <a:solidFill>
+              <a:srgbClr val="FF0000"/>
+            </a:solidFill>
+          </a:ln>
+        </p:spPr>
+        <p:style>
+          <a:lnRef idx="1">
+            <a:schemeClr val="accent1"/>
+          </a:lnRef>
+          <a:fillRef idx="0">
+            <a:schemeClr val="accent1"/>
+          </a:fillRef>
+          <a:effectRef idx="0">
+            <a:schemeClr val="accent1"/>
+          </a:effectRef>
+          <a:fontRef idx="minor">
+            <a:schemeClr val="tx1"/>
+          </a:fontRef>
+        </p:style>
+      </p:cxnSp>
+      <p:cxnSp>
+        <p:nvCxnSpPr>
+          <p:cNvPr id="56" name="Straight Connector 55"/>
+          <p:cNvCxnSpPr/>
+          <p:nvPr/>
+        </p:nvCxnSpPr>
+        <p:spPr>
+          <a:xfrm>
+            <a:off x="4668011" y="2304367"/>
+            <a:ext cx="1228311" cy="450140"/>
+          </a:xfrm>
+          <a:prstGeom prst="line">
+            <a:avLst/>
+          </a:prstGeom>
+          <a:ln w="12700">
+            <a:solidFill>
+              <a:srgbClr val="FF0000"/>
+            </a:solidFill>
+          </a:ln>
+        </p:spPr>
+        <p:style>
+          <a:lnRef idx="1">
+            <a:schemeClr val="accent1"/>
+          </a:lnRef>
+          <a:fillRef idx="0">
+            <a:schemeClr val="accent1"/>
+          </a:fillRef>
+          <a:effectRef idx="0">
+            <a:schemeClr val="accent1"/>
+          </a:effectRef>
+          <a:fontRef idx="minor">
+            <a:schemeClr val="tx1"/>
+          </a:fontRef>
+        </p:style>
+      </p:cxnSp>
+      <p:cxnSp>
+        <p:nvCxnSpPr>
+          <p:cNvPr id="57" name="Straight Connector 56"/>
+          <p:cNvCxnSpPr/>
+          <p:nvPr/>
+        </p:nvCxnSpPr>
+        <p:spPr>
+          <a:xfrm flipV="1">
+            <a:off x="4661211" y="2314404"/>
+            <a:ext cx="1207412" cy="440104"/>
+          </a:xfrm>
+          <a:prstGeom prst="line">
+            <a:avLst/>
+          </a:prstGeom>
+          <a:ln w="12700">
+            <a:solidFill>
+              <a:srgbClr val="FF0000"/>
+            </a:solidFill>
+          </a:ln>
+        </p:spPr>
+        <p:style>
+          <a:lnRef idx="1">
+            <a:schemeClr val="accent1"/>
+          </a:lnRef>
+          <a:fillRef idx="0">
+            <a:schemeClr val="accent1"/>
+          </a:fillRef>
+          <a:effectRef idx="0">
+            <a:schemeClr val="accent1"/>
+          </a:effectRef>
+          <a:fontRef idx="minor">
+            <a:schemeClr val="tx1"/>
+          </a:fontRef>
+        </p:style>
+      </p:cxnSp>
     </p:spTree>
     <p:extLst>
       <p:ext uri="{BB962C8B-B14F-4D97-AF65-F5344CB8AC3E}">
-        <p14:creationId xmlns:p14="http://schemas.microsoft.com/office/powerpoint/2010/main" val="2904222640"/>
+        <p14:creationId xmlns:p14="http://schemas.microsoft.com/office/powerpoint/2010/main" val="1116564702"/>
       </p:ext>
     </p:extLst>
   </p:cSld>

</xml_diff>